<commit_message>
Deleted demo-1 ,made changes to sprint-1.pptx
</commit_message>
<xml_diff>
--- a/Sprint-1.pptx
+++ b/Sprint-1.pptx
@@ -12129,15 +12129,33 @@
                                   </p:childTnLst>
                                 </p:cTn>
                               </p:par>
+                            </p:childTnLst>
+                          </p:cTn>
+                        </p:par>
+                      </p:childTnLst>
+                    </p:cTn>
+                  </p:par>
+                  <p:par>
+                    <p:cTn id="8" fill="hold">
+                      <p:stCondLst>
+                        <p:cond delay="indefinite"/>
+                      </p:stCondLst>
+                      <p:childTnLst>
+                        <p:par>
+                          <p:cTn id="9" fill="hold">
+                            <p:stCondLst>
+                              <p:cond delay="0"/>
+                            </p:stCondLst>
+                            <p:childTnLst>
                               <p:par>
-                                <p:cTn id="8" presetID="10" presetClass="entr" presetSubtype="0" fill="hold" nodeType="withEffect">
+                                <p:cTn id="10" presetID="1" presetClass="entr" presetSubtype="0" fill="hold" nodeType="clickEffect">
                                   <p:stCondLst>
                                     <p:cond delay="0"/>
                                   </p:stCondLst>
                                   <p:childTnLst>
                                     <p:set>
                                       <p:cBhvr>
-                                        <p:cTn id="9" dur="1" fill="hold">
+                                        <p:cTn id="11" dur="1" fill="hold">
                                           <p:stCondLst>
                                             <p:cond delay="0"/>
                                           </p:stCondLst>
@@ -12157,30 +12175,36 @@
                                         <p:strVal val="visible"/>
                                       </p:to>
                                     </p:set>
-                                    <p:animEffect transition="in" filter="fade">
-                                      <p:cBhvr>
-                                        <p:cTn id="10" dur="500"/>
-                                        <p:tgtEl>
-                                          <p:spTgt spid="3">
-                                            <p:txEl>
-                                              <p:pRg st="2" end="2"/>
-                                            </p:txEl>
-                                          </p:spTgt>
-                                        </p:tgtEl>
-                                      </p:cBhvr>
-                                    </p:animEffect>
                                   </p:childTnLst>
                                 </p:cTn>
                               </p:par>
+                            </p:childTnLst>
+                          </p:cTn>
+                        </p:par>
+                      </p:childTnLst>
+                    </p:cTn>
+                  </p:par>
+                  <p:par>
+                    <p:cTn id="12" fill="hold">
+                      <p:stCondLst>
+                        <p:cond delay="indefinite"/>
+                      </p:stCondLst>
+                      <p:childTnLst>
+                        <p:par>
+                          <p:cTn id="13" fill="hold">
+                            <p:stCondLst>
+                              <p:cond delay="0"/>
+                            </p:stCondLst>
+                            <p:childTnLst>
                               <p:par>
-                                <p:cTn id="11" presetID="10" presetClass="entr" presetSubtype="0" fill="hold" nodeType="withEffect">
+                                <p:cTn id="14" presetID="1" presetClass="entr" presetSubtype="0" fill="hold" nodeType="clickEffect">
                                   <p:stCondLst>
                                     <p:cond delay="0"/>
                                   </p:stCondLst>
                                   <p:childTnLst>
                                     <p:set>
                                       <p:cBhvr>
-                                        <p:cTn id="12" dur="1" fill="hold">
+                                        <p:cTn id="15" dur="1" fill="hold">
                                           <p:stCondLst>
                                             <p:cond delay="0"/>
                                           </p:stCondLst>
@@ -12200,18 +12224,6 @@
                                         <p:strVal val="visible"/>
                                       </p:to>
                                     </p:set>
-                                    <p:animEffect transition="in" filter="fade">
-                                      <p:cBhvr>
-                                        <p:cTn id="13" dur="500"/>
-                                        <p:tgtEl>
-                                          <p:spTgt spid="3">
-                                            <p:txEl>
-                                              <p:pRg st="4" end="4"/>
-                                            </p:txEl>
-                                          </p:spTgt>
-                                        </p:tgtEl>
-                                      </p:cBhvr>
-                                    </p:animEffect>
                                   </p:childTnLst>
                                 </p:cTn>
                               </p:par>
@@ -12929,7 +12941,7 @@
         </p:nvSpPr>
         <p:spPr>
           <a:xfrm>
-            <a:off x="1724609" y="1866985"/>
+            <a:off x="1724609" y="1861047"/>
             <a:ext cx="9461134" cy="4991016"/>
           </a:xfrm>
           <a:prstGeom prst="rect">
@@ -13759,8 +13771,8 @@
         </p:nvCxnSpPr>
         <p:spPr>
           <a:xfrm flipH="1">
-            <a:off x="6529188" y="2104373"/>
-            <a:ext cx="42181" cy="4258849"/>
+            <a:off x="6454927" y="2745078"/>
+            <a:ext cx="29401" cy="3632971"/>
           </a:xfrm>
           <a:prstGeom prst="line">
             <a:avLst/>
@@ -13857,6 +13869,70 @@
           </a:p>
         </p:txBody>
       </p:sp>
+      <p:cxnSp>
+        <p:nvCxnSpPr>
+          <p:cNvPr id="4" name="Straight Connector 3"/>
+          <p:cNvCxnSpPr>
+            <a:stCxn id="38" idx="3"/>
+          </p:cNvCxnSpPr>
+          <p:nvPr/>
+        </p:nvCxnSpPr>
+        <p:spPr>
+          <a:xfrm flipV="1">
+            <a:off x="4419628" y="4383443"/>
+            <a:ext cx="508000" cy="4"/>
+          </a:xfrm>
+          <a:prstGeom prst="line">
+            <a:avLst/>
+          </a:prstGeom>
+        </p:spPr>
+        <p:style>
+          <a:lnRef idx="1">
+            <a:schemeClr val="accent1"/>
+          </a:lnRef>
+          <a:fillRef idx="0">
+            <a:schemeClr val="accent1"/>
+          </a:fillRef>
+          <a:effectRef idx="0">
+            <a:schemeClr val="accent1"/>
+          </a:effectRef>
+          <a:fontRef idx="minor">
+            <a:schemeClr val="tx1"/>
+          </a:fontRef>
+        </p:style>
+      </p:cxnSp>
+      <p:cxnSp>
+        <p:nvCxnSpPr>
+          <p:cNvPr id="6" name="Straight Connector 5"/>
+          <p:cNvCxnSpPr>
+            <a:stCxn id="41" idx="3"/>
+          </p:cNvCxnSpPr>
+          <p:nvPr/>
+        </p:nvCxnSpPr>
+        <p:spPr>
+          <a:xfrm flipV="1">
+            <a:off x="8130749" y="4383443"/>
+            <a:ext cx="341871" cy="4"/>
+          </a:xfrm>
+          <a:prstGeom prst="line">
+            <a:avLst/>
+          </a:prstGeom>
+        </p:spPr>
+        <p:style>
+          <a:lnRef idx="1">
+            <a:schemeClr val="accent1"/>
+          </a:lnRef>
+          <a:fillRef idx="0">
+            <a:schemeClr val="accent1"/>
+          </a:fillRef>
+          <a:effectRef idx="0">
+            <a:schemeClr val="accent1"/>
+          </a:effectRef>
+          <a:fontRef idx="minor">
+            <a:schemeClr val="tx1"/>
+          </a:fontRef>
+        </p:style>
+      </p:cxnSp>
     </p:spTree>
     <p:extLst>
       <p:ext uri="{BB962C8B-B14F-4D97-AF65-F5344CB8AC3E}">
@@ -13888,7 +13964,7 @@
                             </p:stCondLst>
                             <p:childTnLst>
                               <p:par>
-                                <p:cTn id="5" presetID="10" presetClass="entr" presetSubtype="0" fill="hold" grpId="0" nodeType="clickEffect">
+                                <p:cTn id="5" presetID="1" presetClass="entr" presetSubtype="0" fill="hold" grpId="0" nodeType="clickEffect">
                                   <p:stCondLst>
                                     <p:cond delay="0"/>
                                   </p:stCondLst>
@@ -13896,59 +13972,6 @@
                                     <p:set>
                                       <p:cBhvr>
                                         <p:cTn id="6" dur="1" fill="hold">
-                                          <p:stCondLst>
-                                            <p:cond delay="0"/>
-                                          </p:stCondLst>
-                                        </p:cTn>
-                                        <p:tgtEl>
-                                          <p:spTgt spid="2"/>
-                                        </p:tgtEl>
-                                        <p:attrNameLst>
-                                          <p:attrName>style.visibility</p:attrName>
-                                        </p:attrNameLst>
-                                      </p:cBhvr>
-                                      <p:to>
-                                        <p:strVal val="visible"/>
-                                      </p:to>
-                                    </p:set>
-                                    <p:animEffect transition="in" filter="fade">
-                                      <p:cBhvr>
-                                        <p:cTn id="7" dur="500"/>
-                                        <p:tgtEl>
-                                          <p:spTgt spid="2"/>
-                                        </p:tgtEl>
-                                      </p:cBhvr>
-                                    </p:animEffect>
-                                  </p:childTnLst>
-                                </p:cTn>
-                              </p:par>
-                            </p:childTnLst>
-                          </p:cTn>
-                        </p:par>
-                      </p:childTnLst>
-                    </p:cTn>
-                  </p:par>
-                  <p:par>
-                    <p:cTn id="8" fill="hold">
-                      <p:stCondLst>
-                        <p:cond delay="indefinite"/>
-                      </p:stCondLst>
-                      <p:childTnLst>
-                        <p:par>
-                          <p:cTn id="9" fill="hold">
-                            <p:stCondLst>
-                              <p:cond delay="0"/>
-                            </p:stCondLst>
-                            <p:childTnLst>
-                              <p:par>
-                                <p:cTn id="10" presetID="10" presetClass="entr" presetSubtype="0" fill="hold" grpId="0" nodeType="clickEffect">
-                                  <p:stCondLst>
-                                    <p:cond delay="500"/>
-                                  </p:stCondLst>
-                                  <p:childTnLst>
-                                    <p:set>
-                                      <p:cBhvr>
-                                        <p:cTn id="11" dur="1" fill="hold">
                                           <p:stCondLst>
                                             <p:cond delay="0"/>
                                           </p:stCondLst>
@@ -13964,14 +13987,681 @@
                                         <p:strVal val="visible"/>
                                       </p:to>
                                     </p:set>
-                                    <p:animEffect transition="in" filter="fade">
+                                  </p:childTnLst>
+                                </p:cTn>
+                              </p:par>
+                              <p:par>
+                                <p:cTn id="7" presetID="1" presetClass="entr" presetSubtype="0" fill="hold" grpId="0" nodeType="withEffect">
+                                  <p:stCondLst>
+                                    <p:cond delay="0"/>
+                                  </p:stCondLst>
+                                  <p:childTnLst>
+                                    <p:set>
                                       <p:cBhvr>
-                                        <p:cTn id="12" dur="500"/>
+                                        <p:cTn id="8" dur="1" fill="hold">
+                                          <p:stCondLst>
+                                            <p:cond delay="0"/>
+                                          </p:stCondLst>
+                                        </p:cTn>
                                         <p:tgtEl>
-                                          <p:spTgt spid="36"/>
+                                          <p:spTgt spid="37"/>
                                         </p:tgtEl>
+                                        <p:attrNameLst>
+                                          <p:attrName>style.visibility</p:attrName>
+                                        </p:attrNameLst>
                                       </p:cBhvr>
-                                    </p:animEffect>
+                                      <p:to>
+                                        <p:strVal val="visible"/>
+                                      </p:to>
+                                    </p:set>
+                                  </p:childTnLst>
+                                </p:cTn>
+                              </p:par>
+                              <p:par>
+                                <p:cTn id="9" presetID="1" presetClass="entr" presetSubtype="0" fill="hold" grpId="0" nodeType="withEffect">
+                                  <p:stCondLst>
+                                    <p:cond delay="0"/>
+                                  </p:stCondLst>
+                                  <p:childTnLst>
+                                    <p:set>
+                                      <p:cBhvr>
+                                        <p:cTn id="10" dur="1" fill="hold">
+                                          <p:stCondLst>
+                                            <p:cond delay="0"/>
+                                          </p:stCondLst>
+                                        </p:cTn>
+                                        <p:tgtEl>
+                                          <p:spTgt spid="38"/>
+                                        </p:tgtEl>
+                                        <p:attrNameLst>
+                                          <p:attrName>style.visibility</p:attrName>
+                                        </p:attrNameLst>
+                                      </p:cBhvr>
+                                      <p:to>
+                                        <p:strVal val="visible"/>
+                                      </p:to>
+                                    </p:set>
+                                  </p:childTnLst>
+                                </p:cTn>
+                              </p:par>
+                              <p:par>
+                                <p:cTn id="11" presetID="1" presetClass="entr" presetSubtype="0" fill="hold" grpId="0" nodeType="withEffect">
+                                  <p:stCondLst>
+                                    <p:cond delay="0"/>
+                                  </p:stCondLst>
+                                  <p:childTnLst>
+                                    <p:set>
+                                      <p:cBhvr>
+                                        <p:cTn id="12" dur="1" fill="hold">
+                                          <p:stCondLst>
+                                            <p:cond delay="0"/>
+                                          </p:stCondLst>
+                                        </p:cTn>
+                                        <p:tgtEl>
+                                          <p:spTgt spid="39"/>
+                                        </p:tgtEl>
+                                        <p:attrNameLst>
+                                          <p:attrName>style.visibility</p:attrName>
+                                        </p:attrNameLst>
+                                      </p:cBhvr>
+                                      <p:to>
+                                        <p:strVal val="visible"/>
+                                      </p:to>
+                                    </p:set>
+                                  </p:childTnLst>
+                                </p:cTn>
+                              </p:par>
+                              <p:par>
+                                <p:cTn id="13" presetID="1" presetClass="entr" presetSubtype="0" fill="hold" grpId="0" nodeType="withEffect">
+                                  <p:stCondLst>
+                                    <p:cond delay="0"/>
+                                  </p:stCondLst>
+                                  <p:childTnLst>
+                                    <p:set>
+                                      <p:cBhvr>
+                                        <p:cTn id="14" dur="1" fill="hold">
+                                          <p:stCondLst>
+                                            <p:cond delay="0"/>
+                                          </p:stCondLst>
+                                        </p:cTn>
+                                        <p:tgtEl>
+                                          <p:spTgt spid="40"/>
+                                        </p:tgtEl>
+                                        <p:attrNameLst>
+                                          <p:attrName>style.visibility</p:attrName>
+                                        </p:attrNameLst>
+                                      </p:cBhvr>
+                                      <p:to>
+                                        <p:strVal val="visible"/>
+                                      </p:to>
+                                    </p:set>
+                                  </p:childTnLst>
+                                </p:cTn>
+                              </p:par>
+                              <p:par>
+                                <p:cTn id="15" presetID="1" presetClass="entr" presetSubtype="0" fill="hold" grpId="0" nodeType="withEffect">
+                                  <p:stCondLst>
+                                    <p:cond delay="0"/>
+                                  </p:stCondLst>
+                                  <p:childTnLst>
+                                    <p:set>
+                                      <p:cBhvr>
+                                        <p:cTn id="16" dur="1" fill="hold">
+                                          <p:stCondLst>
+                                            <p:cond delay="0"/>
+                                          </p:stCondLst>
+                                        </p:cTn>
+                                        <p:tgtEl>
+                                          <p:spTgt spid="41"/>
+                                        </p:tgtEl>
+                                        <p:attrNameLst>
+                                          <p:attrName>style.visibility</p:attrName>
+                                        </p:attrNameLst>
+                                      </p:cBhvr>
+                                      <p:to>
+                                        <p:strVal val="visible"/>
+                                      </p:to>
+                                    </p:set>
+                                  </p:childTnLst>
+                                </p:cTn>
+                              </p:par>
+                              <p:par>
+                                <p:cTn id="17" presetID="1" presetClass="entr" presetSubtype="0" fill="hold" grpId="0" nodeType="withEffect">
+                                  <p:stCondLst>
+                                    <p:cond delay="0"/>
+                                  </p:stCondLst>
+                                  <p:childTnLst>
+                                    <p:set>
+                                      <p:cBhvr>
+                                        <p:cTn id="18" dur="1" fill="hold">
+                                          <p:stCondLst>
+                                            <p:cond delay="0"/>
+                                          </p:stCondLst>
+                                        </p:cTn>
+                                        <p:tgtEl>
+                                          <p:spTgt spid="42"/>
+                                        </p:tgtEl>
+                                        <p:attrNameLst>
+                                          <p:attrName>style.visibility</p:attrName>
+                                        </p:attrNameLst>
+                                      </p:cBhvr>
+                                      <p:to>
+                                        <p:strVal val="visible"/>
+                                      </p:to>
+                                    </p:set>
+                                  </p:childTnLst>
+                                </p:cTn>
+                              </p:par>
+                              <p:par>
+                                <p:cTn id="19" presetID="1" presetClass="entr" presetSubtype="0" fill="hold" nodeType="withEffect">
+                                  <p:stCondLst>
+                                    <p:cond delay="0"/>
+                                  </p:stCondLst>
+                                  <p:childTnLst>
+                                    <p:set>
+                                      <p:cBhvr>
+                                        <p:cTn id="20" dur="1" fill="hold">
+                                          <p:stCondLst>
+                                            <p:cond delay="0"/>
+                                          </p:stCondLst>
+                                        </p:cTn>
+                                        <p:tgtEl>
+                                          <p:spTgt spid="43"/>
+                                        </p:tgtEl>
+                                        <p:attrNameLst>
+                                          <p:attrName>style.visibility</p:attrName>
+                                        </p:attrNameLst>
+                                      </p:cBhvr>
+                                      <p:to>
+                                        <p:strVal val="visible"/>
+                                      </p:to>
+                                    </p:set>
+                                  </p:childTnLst>
+                                </p:cTn>
+                              </p:par>
+                              <p:par>
+                                <p:cTn id="21" presetID="1" presetClass="entr" presetSubtype="0" fill="hold" nodeType="withEffect">
+                                  <p:stCondLst>
+                                    <p:cond delay="0"/>
+                                  </p:stCondLst>
+                                  <p:childTnLst>
+                                    <p:set>
+                                      <p:cBhvr>
+                                        <p:cTn id="22" dur="1" fill="hold">
+                                          <p:stCondLst>
+                                            <p:cond delay="0"/>
+                                          </p:stCondLst>
+                                        </p:cTn>
+                                        <p:tgtEl>
+                                          <p:spTgt spid="44"/>
+                                        </p:tgtEl>
+                                        <p:attrNameLst>
+                                          <p:attrName>style.visibility</p:attrName>
+                                        </p:attrNameLst>
+                                      </p:cBhvr>
+                                      <p:to>
+                                        <p:strVal val="visible"/>
+                                      </p:to>
+                                    </p:set>
+                                  </p:childTnLst>
+                                </p:cTn>
+                              </p:par>
+                              <p:par>
+                                <p:cTn id="23" presetID="1" presetClass="entr" presetSubtype="0" fill="hold" nodeType="withEffect">
+                                  <p:stCondLst>
+                                    <p:cond delay="0"/>
+                                  </p:stCondLst>
+                                  <p:childTnLst>
+                                    <p:set>
+                                      <p:cBhvr>
+                                        <p:cTn id="24" dur="1" fill="hold">
+                                          <p:stCondLst>
+                                            <p:cond delay="0"/>
+                                          </p:stCondLst>
+                                        </p:cTn>
+                                        <p:tgtEl>
+                                          <p:spTgt spid="45"/>
+                                        </p:tgtEl>
+                                        <p:attrNameLst>
+                                          <p:attrName>style.visibility</p:attrName>
+                                        </p:attrNameLst>
+                                      </p:cBhvr>
+                                      <p:to>
+                                        <p:strVal val="visible"/>
+                                      </p:to>
+                                    </p:set>
+                                  </p:childTnLst>
+                                </p:cTn>
+                              </p:par>
+                              <p:par>
+                                <p:cTn id="25" presetID="1" presetClass="entr" presetSubtype="0" fill="hold" nodeType="withEffect">
+                                  <p:stCondLst>
+                                    <p:cond delay="0"/>
+                                  </p:stCondLst>
+                                  <p:childTnLst>
+                                    <p:set>
+                                      <p:cBhvr>
+                                        <p:cTn id="26" dur="1" fill="hold">
+                                          <p:stCondLst>
+                                            <p:cond delay="0"/>
+                                          </p:stCondLst>
+                                        </p:cTn>
+                                        <p:tgtEl>
+                                          <p:spTgt spid="46"/>
+                                        </p:tgtEl>
+                                        <p:attrNameLst>
+                                          <p:attrName>style.visibility</p:attrName>
+                                        </p:attrNameLst>
+                                      </p:cBhvr>
+                                      <p:to>
+                                        <p:strVal val="visible"/>
+                                      </p:to>
+                                    </p:set>
+                                  </p:childTnLst>
+                                </p:cTn>
+                              </p:par>
+                              <p:par>
+                                <p:cTn id="27" presetID="1" presetClass="entr" presetSubtype="0" fill="hold" nodeType="withEffect">
+                                  <p:stCondLst>
+                                    <p:cond delay="0"/>
+                                  </p:stCondLst>
+                                  <p:childTnLst>
+                                    <p:set>
+                                      <p:cBhvr>
+                                        <p:cTn id="28" dur="1" fill="hold">
+                                          <p:stCondLst>
+                                            <p:cond delay="0"/>
+                                          </p:stCondLst>
+                                        </p:cTn>
+                                        <p:tgtEl>
+                                          <p:spTgt spid="47"/>
+                                        </p:tgtEl>
+                                        <p:attrNameLst>
+                                          <p:attrName>style.visibility</p:attrName>
+                                        </p:attrNameLst>
+                                      </p:cBhvr>
+                                      <p:to>
+                                        <p:strVal val="visible"/>
+                                      </p:to>
+                                    </p:set>
+                                  </p:childTnLst>
+                                </p:cTn>
+                              </p:par>
+                              <p:par>
+                                <p:cTn id="29" presetID="1" presetClass="entr" presetSubtype="0" fill="hold" grpId="0" nodeType="withEffect">
+                                  <p:stCondLst>
+                                    <p:cond delay="0"/>
+                                  </p:stCondLst>
+                                  <p:childTnLst>
+                                    <p:set>
+                                      <p:cBhvr>
+                                        <p:cTn id="30" dur="1" fill="hold">
+                                          <p:stCondLst>
+                                            <p:cond delay="0"/>
+                                          </p:stCondLst>
+                                        </p:cTn>
+                                        <p:tgtEl>
+                                          <p:spTgt spid="48"/>
+                                        </p:tgtEl>
+                                        <p:attrNameLst>
+                                          <p:attrName>style.visibility</p:attrName>
+                                        </p:attrNameLst>
+                                      </p:cBhvr>
+                                      <p:to>
+                                        <p:strVal val="visible"/>
+                                      </p:to>
+                                    </p:set>
+                                  </p:childTnLst>
+                                </p:cTn>
+                              </p:par>
+                              <p:par>
+                                <p:cTn id="31" presetID="1" presetClass="entr" presetSubtype="0" fill="hold" nodeType="withEffect">
+                                  <p:stCondLst>
+                                    <p:cond delay="0"/>
+                                  </p:stCondLst>
+                                  <p:childTnLst>
+                                    <p:set>
+                                      <p:cBhvr>
+                                        <p:cTn id="32" dur="1" fill="hold">
+                                          <p:stCondLst>
+                                            <p:cond delay="0"/>
+                                          </p:stCondLst>
+                                        </p:cTn>
+                                        <p:tgtEl>
+                                          <p:spTgt spid="49"/>
+                                        </p:tgtEl>
+                                        <p:attrNameLst>
+                                          <p:attrName>style.visibility</p:attrName>
+                                        </p:attrNameLst>
+                                      </p:cBhvr>
+                                      <p:to>
+                                        <p:strVal val="visible"/>
+                                      </p:to>
+                                    </p:set>
+                                  </p:childTnLst>
+                                </p:cTn>
+                              </p:par>
+                              <p:par>
+                                <p:cTn id="33" presetID="1" presetClass="entr" presetSubtype="0" fill="hold" nodeType="withEffect">
+                                  <p:stCondLst>
+                                    <p:cond delay="0"/>
+                                  </p:stCondLst>
+                                  <p:childTnLst>
+                                    <p:set>
+                                      <p:cBhvr>
+                                        <p:cTn id="34" dur="1" fill="hold">
+                                          <p:stCondLst>
+                                            <p:cond delay="0"/>
+                                          </p:stCondLst>
+                                        </p:cTn>
+                                        <p:tgtEl>
+                                          <p:spTgt spid="50"/>
+                                        </p:tgtEl>
+                                        <p:attrNameLst>
+                                          <p:attrName>style.visibility</p:attrName>
+                                        </p:attrNameLst>
+                                      </p:cBhvr>
+                                      <p:to>
+                                        <p:strVal val="visible"/>
+                                      </p:to>
+                                    </p:set>
+                                  </p:childTnLst>
+                                </p:cTn>
+                              </p:par>
+                              <p:par>
+                                <p:cTn id="35" presetID="1" presetClass="entr" presetSubtype="0" fill="hold" grpId="0" nodeType="withEffect">
+                                  <p:stCondLst>
+                                    <p:cond delay="0"/>
+                                  </p:stCondLst>
+                                  <p:childTnLst>
+                                    <p:set>
+                                      <p:cBhvr>
+                                        <p:cTn id="36" dur="1" fill="hold">
+                                          <p:stCondLst>
+                                            <p:cond delay="0"/>
+                                          </p:stCondLst>
+                                        </p:cTn>
+                                        <p:tgtEl>
+                                          <p:spTgt spid="52"/>
+                                        </p:tgtEl>
+                                        <p:attrNameLst>
+                                          <p:attrName>style.visibility</p:attrName>
+                                        </p:attrNameLst>
+                                      </p:cBhvr>
+                                      <p:to>
+                                        <p:strVal val="visible"/>
+                                      </p:to>
+                                    </p:set>
+                                  </p:childTnLst>
+                                </p:cTn>
+                              </p:par>
+                              <p:par>
+                                <p:cTn id="37" presetID="1" presetClass="entr" presetSubtype="0" fill="hold" nodeType="withEffect">
+                                  <p:stCondLst>
+                                    <p:cond delay="0"/>
+                                  </p:stCondLst>
+                                  <p:childTnLst>
+                                    <p:set>
+                                      <p:cBhvr>
+                                        <p:cTn id="38" dur="1" fill="hold">
+                                          <p:stCondLst>
+                                            <p:cond delay="0"/>
+                                          </p:stCondLst>
+                                        </p:cTn>
+                                        <p:tgtEl>
+                                          <p:spTgt spid="53"/>
+                                        </p:tgtEl>
+                                        <p:attrNameLst>
+                                          <p:attrName>style.visibility</p:attrName>
+                                        </p:attrNameLst>
+                                      </p:cBhvr>
+                                      <p:to>
+                                        <p:strVal val="visible"/>
+                                      </p:to>
+                                    </p:set>
+                                  </p:childTnLst>
+                                </p:cTn>
+                              </p:par>
+                              <p:par>
+                                <p:cTn id="39" presetID="1" presetClass="entr" presetSubtype="0" fill="hold" grpId="0" nodeType="withEffect">
+                                  <p:stCondLst>
+                                    <p:cond delay="0"/>
+                                  </p:stCondLst>
+                                  <p:childTnLst>
+                                    <p:set>
+                                      <p:cBhvr>
+                                        <p:cTn id="40" dur="1" fill="hold">
+                                          <p:stCondLst>
+                                            <p:cond delay="0"/>
+                                          </p:stCondLst>
+                                        </p:cTn>
+                                        <p:tgtEl>
+                                          <p:spTgt spid="54"/>
+                                        </p:tgtEl>
+                                        <p:attrNameLst>
+                                          <p:attrName>style.visibility</p:attrName>
+                                        </p:attrNameLst>
+                                      </p:cBhvr>
+                                      <p:to>
+                                        <p:strVal val="visible"/>
+                                      </p:to>
+                                    </p:set>
+                                  </p:childTnLst>
+                                </p:cTn>
+                              </p:par>
+                              <p:par>
+                                <p:cTn id="41" presetID="1" presetClass="entr" presetSubtype="0" fill="hold" nodeType="withEffect">
+                                  <p:stCondLst>
+                                    <p:cond delay="0"/>
+                                  </p:stCondLst>
+                                  <p:childTnLst>
+                                    <p:set>
+                                      <p:cBhvr>
+                                        <p:cTn id="42" dur="1" fill="hold">
+                                          <p:stCondLst>
+                                            <p:cond delay="0"/>
+                                          </p:stCondLst>
+                                        </p:cTn>
+                                        <p:tgtEl>
+                                          <p:spTgt spid="55"/>
+                                        </p:tgtEl>
+                                        <p:attrNameLst>
+                                          <p:attrName>style.visibility</p:attrName>
+                                        </p:attrNameLst>
+                                      </p:cBhvr>
+                                      <p:to>
+                                        <p:strVal val="visible"/>
+                                      </p:to>
+                                    </p:set>
+                                  </p:childTnLst>
+                                </p:cTn>
+                              </p:par>
+                              <p:par>
+                                <p:cTn id="43" presetID="1" presetClass="entr" presetSubtype="0" fill="hold" nodeType="withEffect">
+                                  <p:stCondLst>
+                                    <p:cond delay="0"/>
+                                  </p:stCondLst>
+                                  <p:childTnLst>
+                                    <p:set>
+                                      <p:cBhvr>
+                                        <p:cTn id="44" dur="1" fill="hold">
+                                          <p:stCondLst>
+                                            <p:cond delay="0"/>
+                                          </p:stCondLst>
+                                        </p:cTn>
+                                        <p:tgtEl>
+                                          <p:spTgt spid="57"/>
+                                        </p:tgtEl>
+                                        <p:attrNameLst>
+                                          <p:attrName>style.visibility</p:attrName>
+                                        </p:attrNameLst>
+                                      </p:cBhvr>
+                                      <p:to>
+                                        <p:strVal val="visible"/>
+                                      </p:to>
+                                    </p:set>
+                                  </p:childTnLst>
+                                </p:cTn>
+                              </p:par>
+                              <p:par>
+                                <p:cTn id="45" presetID="1" presetClass="entr" presetSubtype="0" fill="hold" nodeType="withEffect">
+                                  <p:stCondLst>
+                                    <p:cond delay="0"/>
+                                  </p:stCondLst>
+                                  <p:childTnLst>
+                                    <p:set>
+                                      <p:cBhvr>
+                                        <p:cTn id="46" dur="1" fill="hold">
+                                          <p:stCondLst>
+                                            <p:cond delay="0"/>
+                                          </p:stCondLst>
+                                        </p:cTn>
+                                        <p:tgtEl>
+                                          <p:spTgt spid="60"/>
+                                        </p:tgtEl>
+                                        <p:attrNameLst>
+                                          <p:attrName>style.visibility</p:attrName>
+                                        </p:attrNameLst>
+                                      </p:cBhvr>
+                                      <p:to>
+                                        <p:strVal val="visible"/>
+                                      </p:to>
+                                    </p:set>
+                                  </p:childTnLst>
+                                </p:cTn>
+                              </p:par>
+                              <p:par>
+                                <p:cTn id="47" presetID="1" presetClass="entr" presetSubtype="0" fill="hold" nodeType="withEffect">
+                                  <p:stCondLst>
+                                    <p:cond delay="0"/>
+                                  </p:stCondLst>
+                                  <p:childTnLst>
+                                    <p:set>
+                                      <p:cBhvr>
+                                        <p:cTn id="48" dur="1" fill="hold">
+                                          <p:stCondLst>
+                                            <p:cond delay="0"/>
+                                          </p:stCondLst>
+                                        </p:cTn>
+                                        <p:tgtEl>
+                                          <p:spTgt spid="66"/>
+                                        </p:tgtEl>
+                                        <p:attrNameLst>
+                                          <p:attrName>style.visibility</p:attrName>
+                                        </p:attrNameLst>
+                                      </p:cBhvr>
+                                      <p:to>
+                                        <p:strVal val="visible"/>
+                                      </p:to>
+                                    </p:set>
+                                  </p:childTnLst>
+                                </p:cTn>
+                              </p:par>
+                              <p:par>
+                                <p:cTn id="49" presetID="1" presetClass="entr" presetSubtype="0" fill="hold" grpId="0" nodeType="withEffect">
+                                  <p:stCondLst>
+                                    <p:cond delay="0"/>
+                                  </p:stCondLst>
+                                  <p:childTnLst>
+                                    <p:set>
+                                      <p:cBhvr>
+                                        <p:cTn id="50" dur="1" fill="hold">
+                                          <p:stCondLst>
+                                            <p:cond delay="0"/>
+                                          </p:stCondLst>
+                                        </p:cTn>
+                                        <p:tgtEl>
+                                          <p:spTgt spid="81"/>
+                                        </p:tgtEl>
+                                        <p:attrNameLst>
+                                          <p:attrName>style.visibility</p:attrName>
+                                        </p:attrNameLst>
+                                      </p:cBhvr>
+                                      <p:to>
+                                        <p:strVal val="visible"/>
+                                      </p:to>
+                                    </p:set>
+                                  </p:childTnLst>
+                                </p:cTn>
+                              </p:par>
+                              <p:par>
+                                <p:cTn id="51" presetID="1" presetClass="entr" presetSubtype="0" fill="hold" grpId="0" nodeType="withEffect">
+                                  <p:stCondLst>
+                                    <p:cond delay="0"/>
+                                  </p:stCondLst>
+                                  <p:childTnLst>
+                                    <p:set>
+                                      <p:cBhvr>
+                                        <p:cTn id="52" dur="1" fill="hold">
+                                          <p:stCondLst>
+                                            <p:cond delay="0"/>
+                                          </p:stCondLst>
+                                        </p:cTn>
+                                        <p:tgtEl>
+                                          <p:spTgt spid="82"/>
+                                        </p:tgtEl>
+                                        <p:attrNameLst>
+                                          <p:attrName>style.visibility</p:attrName>
+                                        </p:attrNameLst>
+                                      </p:cBhvr>
+                                      <p:to>
+                                        <p:strVal val="visible"/>
+                                      </p:to>
+                                    </p:set>
+                                  </p:childTnLst>
+                                </p:cTn>
+                              </p:par>
+                              <p:par>
+                                <p:cTn id="53" presetID="1" presetClass="entr" presetSubtype="0" fill="hold" nodeType="withEffect">
+                                  <p:stCondLst>
+                                    <p:cond delay="0"/>
+                                  </p:stCondLst>
+                                  <p:childTnLst>
+                                    <p:set>
+                                      <p:cBhvr>
+                                        <p:cTn id="54" dur="1" fill="hold">
+                                          <p:stCondLst>
+                                            <p:cond delay="0"/>
+                                          </p:stCondLst>
+                                        </p:cTn>
+                                        <p:tgtEl>
+                                          <p:spTgt spid="4"/>
+                                        </p:tgtEl>
+                                        <p:attrNameLst>
+                                          <p:attrName>style.visibility</p:attrName>
+                                        </p:attrNameLst>
+                                      </p:cBhvr>
+                                      <p:to>
+                                        <p:strVal val="visible"/>
+                                      </p:to>
+                                    </p:set>
+                                  </p:childTnLst>
+                                </p:cTn>
+                              </p:par>
+                              <p:par>
+                                <p:cTn id="55" presetID="1" presetClass="entr" presetSubtype="0" fill="hold" nodeType="withEffect">
+                                  <p:stCondLst>
+                                    <p:cond delay="0"/>
+                                  </p:stCondLst>
+                                  <p:childTnLst>
+                                    <p:set>
+                                      <p:cBhvr>
+                                        <p:cTn id="56" dur="1" fill="hold">
+                                          <p:stCondLst>
+                                            <p:cond delay="0"/>
+                                          </p:stCondLst>
+                                        </p:cTn>
+                                        <p:tgtEl>
+                                          <p:spTgt spid="6"/>
+                                        </p:tgtEl>
+                                        <p:attrNameLst>
+                                          <p:attrName>style.visibility</p:attrName>
+                                        </p:attrNameLst>
+                                      </p:cBhvr>
+                                      <p:to>
+                                        <p:strVal val="visible"/>
+                                      </p:to>
+                                    </p:set>
                                   </p:childTnLst>
                                 </p:cTn>
                               </p:par>
@@ -14003,8 +14693,18 @@
       </p:par>
     </p:tnLst>
     <p:bldLst>
-      <p:bldP spid="2" grpId="0"/>
       <p:bldP spid="36" grpId="0" animBg="1"/>
+      <p:bldP spid="37" grpId="0" animBg="1"/>
+      <p:bldP spid="38" grpId="0" animBg="1"/>
+      <p:bldP spid="39" grpId="0" animBg="1"/>
+      <p:bldP spid="40" grpId="0" animBg="1"/>
+      <p:bldP spid="41" grpId="0" animBg="1"/>
+      <p:bldP spid="42" grpId="0" animBg="1"/>
+      <p:bldP spid="48" grpId="0" animBg="1"/>
+      <p:bldP spid="52" grpId="0" animBg="1"/>
+      <p:bldP spid="54" grpId="0" animBg="1"/>
+      <p:bldP spid="81" grpId="0"/>
+      <p:bldP spid="82" grpId="0"/>
     </p:bldLst>
   </p:timing>
 </p:sld>

</xml_diff>

<commit_message>
minor changes on slide2
</commit_message>
<xml_diff>
--- a/Sprint-1.pptx
+++ b/Sprint-1.pptx
@@ -12445,59 +12445,6 @@
                                           </p:stCondLst>
                                         </p:cTn>
                                         <p:tgtEl>
-                                          <p:spTgt spid="2"/>
-                                        </p:tgtEl>
-                                        <p:attrNameLst>
-                                          <p:attrName>style.visibility</p:attrName>
-                                        </p:attrNameLst>
-                                      </p:cBhvr>
-                                      <p:to>
-                                        <p:strVal val="visible"/>
-                                      </p:to>
-                                    </p:set>
-                                    <p:animEffect transition="in" filter="fade">
-                                      <p:cBhvr>
-                                        <p:cTn id="7" dur="500"/>
-                                        <p:tgtEl>
-                                          <p:spTgt spid="2"/>
-                                        </p:tgtEl>
-                                      </p:cBhvr>
-                                    </p:animEffect>
-                                  </p:childTnLst>
-                                </p:cTn>
-                              </p:par>
-                            </p:childTnLst>
-                          </p:cTn>
-                        </p:par>
-                      </p:childTnLst>
-                    </p:cTn>
-                  </p:par>
-                  <p:par>
-                    <p:cTn id="8" fill="hold">
-                      <p:stCondLst>
-                        <p:cond delay="indefinite"/>
-                      </p:stCondLst>
-                      <p:childTnLst>
-                        <p:par>
-                          <p:cTn id="9" fill="hold">
-                            <p:stCondLst>
-                              <p:cond delay="0"/>
-                            </p:stCondLst>
-                            <p:childTnLst>
-                              <p:par>
-                                <p:cTn id="10" presetID="10" presetClass="entr" presetSubtype="0" fill="hold" grpId="0" nodeType="clickEffect">
-                                  <p:stCondLst>
-                                    <p:cond delay="0"/>
-                                  </p:stCondLst>
-                                  <p:childTnLst>
-                                    <p:set>
-                                      <p:cBhvr>
-                                        <p:cTn id="11" dur="1" fill="hold">
-                                          <p:stCondLst>
-                                            <p:cond delay="0"/>
-                                          </p:stCondLst>
-                                        </p:cTn>
-                                        <p:tgtEl>
                                           <p:spTgt spid="3">
                                             <p:txEl>
                                               <p:pRg st="0" end="0"/>
@@ -12514,7 +12461,7 @@
                                     </p:set>
                                     <p:animEffect transition="in" filter="fade">
                                       <p:cBhvr>
-                                        <p:cTn id="12" dur="500"/>
+                                        <p:cTn id="7" dur="500"/>
                                         <p:tgtEl>
                                           <p:spTgt spid="3">
                                             <p:txEl>
@@ -12531,20 +12478,20 @@
                           </p:cTn>
                         </p:par>
                         <p:par>
-                          <p:cTn id="13" fill="hold">
+                          <p:cTn id="8" fill="hold">
                             <p:stCondLst>
                               <p:cond delay="500"/>
                             </p:stCondLst>
                             <p:childTnLst>
                               <p:par>
-                                <p:cTn id="14" presetID="10" presetClass="entr" presetSubtype="0" fill="hold" grpId="0" nodeType="afterEffect">
+                                <p:cTn id="9" presetID="10" presetClass="entr" presetSubtype="0" fill="hold" grpId="0" nodeType="afterEffect">
                                   <p:stCondLst>
                                     <p:cond delay="0"/>
                                   </p:stCondLst>
                                   <p:childTnLst>
                                     <p:set>
                                       <p:cBhvr>
-                                        <p:cTn id="15" dur="1" fill="hold">
+                                        <p:cTn id="10" dur="1" fill="hold">
                                           <p:stCondLst>
                                             <p:cond delay="0"/>
                                           </p:stCondLst>
@@ -12566,7 +12513,7 @@
                                     </p:set>
                                     <p:animEffect transition="in" filter="fade">
                                       <p:cBhvr>
-                                        <p:cTn id="16" dur="500"/>
+                                        <p:cTn id="11" dur="500"/>
                                         <p:tgtEl>
                                           <p:spTgt spid="3">
                                             <p:txEl>
@@ -12583,20 +12530,20 @@
                           </p:cTn>
                         </p:par>
                         <p:par>
-                          <p:cTn id="17" fill="hold">
+                          <p:cTn id="12" fill="hold">
                             <p:stCondLst>
                               <p:cond delay="1000"/>
                             </p:stCondLst>
                             <p:childTnLst>
                               <p:par>
-                                <p:cTn id="18" presetID="10" presetClass="entr" presetSubtype="0" fill="hold" grpId="0" nodeType="afterEffect">
+                                <p:cTn id="13" presetID="10" presetClass="entr" presetSubtype="0" fill="hold" grpId="0" nodeType="afterEffect">
                                   <p:stCondLst>
                                     <p:cond delay="0"/>
                                   </p:stCondLst>
                                   <p:childTnLst>
                                     <p:set>
                                       <p:cBhvr>
-                                        <p:cTn id="19" dur="1" fill="hold">
+                                        <p:cTn id="14" dur="1" fill="hold">
                                           <p:stCondLst>
                                             <p:cond delay="0"/>
                                           </p:stCondLst>
@@ -12618,7 +12565,7 @@
                                     </p:set>
                                     <p:animEffect transition="in" filter="fade">
                                       <p:cBhvr>
-                                        <p:cTn id="20" dur="500"/>
+                                        <p:cTn id="15" dur="500"/>
                                         <p:tgtEl>
                                           <p:spTgt spid="3">
                                             <p:txEl>
@@ -12638,26 +12585,26 @@
                     </p:cTn>
                   </p:par>
                   <p:par>
-                    <p:cTn id="21" fill="hold">
+                    <p:cTn id="16" fill="hold">
                       <p:stCondLst>
                         <p:cond delay="indefinite"/>
                       </p:stCondLst>
                       <p:childTnLst>
                         <p:par>
-                          <p:cTn id="22" fill="hold">
+                          <p:cTn id="17" fill="hold">
                             <p:stCondLst>
                               <p:cond delay="0"/>
                             </p:stCondLst>
                             <p:childTnLst>
                               <p:par>
-                                <p:cTn id="23" presetID="10" presetClass="entr" presetSubtype="0" fill="hold" grpId="0" nodeType="clickEffect">
+                                <p:cTn id="18" presetID="10" presetClass="entr" presetSubtype="0" fill="hold" grpId="0" nodeType="clickEffect">
                                   <p:stCondLst>
                                     <p:cond delay="0"/>
                                   </p:stCondLst>
                                   <p:childTnLst>
                                     <p:set>
                                       <p:cBhvr>
-                                        <p:cTn id="24" dur="1" fill="hold">
+                                        <p:cTn id="19" dur="1" fill="hold">
                                           <p:stCondLst>
                                             <p:cond delay="0"/>
                                           </p:stCondLst>
@@ -12679,7 +12626,7 @@
                                     </p:set>
                                     <p:animEffect transition="in" filter="fade">
                                       <p:cBhvr>
-                                        <p:cTn id="25" dur="500"/>
+                                        <p:cTn id="20" dur="500"/>
                                         <p:tgtEl>
                                           <p:spTgt spid="3">
                                             <p:txEl>
@@ -12696,20 +12643,20 @@
                           </p:cTn>
                         </p:par>
                         <p:par>
-                          <p:cTn id="26" fill="hold">
+                          <p:cTn id="21" fill="hold">
                             <p:stCondLst>
                               <p:cond delay="500"/>
                             </p:stCondLst>
                             <p:childTnLst>
                               <p:par>
-                                <p:cTn id="27" presetID="10" presetClass="entr" presetSubtype="0" fill="hold" grpId="0" nodeType="afterEffect">
+                                <p:cTn id="22" presetID="10" presetClass="entr" presetSubtype="0" fill="hold" grpId="0" nodeType="afterEffect">
                                   <p:stCondLst>
                                     <p:cond delay="0"/>
                                   </p:stCondLst>
                                   <p:childTnLst>
                                     <p:set>
                                       <p:cBhvr>
-                                        <p:cTn id="28" dur="1" fill="hold">
+                                        <p:cTn id="23" dur="1" fill="hold">
                                           <p:stCondLst>
                                             <p:cond delay="0"/>
                                           </p:stCondLst>
@@ -12731,7 +12678,7 @@
                                     </p:set>
                                     <p:animEffect transition="in" filter="fade">
                                       <p:cBhvr>
-                                        <p:cTn id="29" dur="500"/>
+                                        <p:cTn id="24" dur="500"/>
                                         <p:tgtEl>
                                           <p:spTgt spid="3">
                                             <p:txEl>
@@ -12751,26 +12698,26 @@
                     </p:cTn>
                   </p:par>
                   <p:par>
-                    <p:cTn id="30" fill="hold">
+                    <p:cTn id="25" fill="hold">
                       <p:stCondLst>
                         <p:cond delay="indefinite"/>
                       </p:stCondLst>
                       <p:childTnLst>
                         <p:par>
-                          <p:cTn id="31" fill="hold">
+                          <p:cTn id="26" fill="hold">
                             <p:stCondLst>
                               <p:cond delay="0"/>
                             </p:stCondLst>
                             <p:childTnLst>
                               <p:par>
-                                <p:cTn id="32" presetID="10" presetClass="entr" presetSubtype="0" fill="hold" grpId="0" nodeType="clickEffect">
+                                <p:cTn id="27" presetID="10" presetClass="entr" presetSubtype="0" fill="hold" grpId="0" nodeType="clickEffect">
                                   <p:stCondLst>
                                     <p:cond delay="0"/>
                                   </p:stCondLst>
                                   <p:childTnLst>
                                     <p:set>
                                       <p:cBhvr>
-                                        <p:cTn id="33" dur="1" fill="hold">
+                                        <p:cTn id="28" dur="1" fill="hold">
                                           <p:stCondLst>
                                             <p:cond delay="0"/>
                                           </p:stCondLst>
@@ -12792,7 +12739,7 @@
                                     </p:set>
                                     <p:animEffect transition="in" filter="fade">
                                       <p:cBhvr>
-                                        <p:cTn id="34" dur="500"/>
+                                        <p:cTn id="29" dur="500"/>
                                         <p:tgtEl>
                                           <p:spTgt spid="3">
                                             <p:txEl>
@@ -12809,20 +12756,20 @@
                           </p:cTn>
                         </p:par>
                         <p:par>
-                          <p:cTn id="35" fill="hold">
+                          <p:cTn id="30" fill="hold">
                             <p:stCondLst>
                               <p:cond delay="500"/>
                             </p:stCondLst>
                             <p:childTnLst>
                               <p:par>
-                                <p:cTn id="36" presetID="10" presetClass="entr" presetSubtype="0" fill="hold" grpId="0" nodeType="afterEffect">
+                                <p:cTn id="31" presetID="10" presetClass="entr" presetSubtype="0" fill="hold" grpId="0" nodeType="afterEffect">
                                   <p:stCondLst>
                                     <p:cond delay="0"/>
                                   </p:stCondLst>
                                   <p:childTnLst>
                                     <p:set>
                                       <p:cBhvr>
-                                        <p:cTn id="37" dur="1" fill="hold">
+                                        <p:cTn id="32" dur="1" fill="hold">
                                           <p:stCondLst>
                                             <p:cond delay="0"/>
                                           </p:stCondLst>
@@ -12844,7 +12791,7 @@
                                     </p:set>
                                     <p:animEffect transition="in" filter="fade">
                                       <p:cBhvr>
-                                        <p:cTn id="38" dur="500"/>
+                                        <p:cTn id="33" dur="500"/>
                                         <p:tgtEl>
                                           <p:spTgt spid="3">
                                             <p:txEl>
@@ -12885,7 +12832,6 @@
       </p:par>
     </p:tnLst>
     <p:bldLst>
-      <p:bldP spid="2" grpId="0"/>
       <p:bldP spid="3" grpId="0" uiExpand="1" build="p"/>
     </p:bldLst>
   </p:timing>

</xml_diff>

<commit_message>
minor changes on slide 14
</commit_message>
<xml_diff>
--- a/Sprint-1.pptx
+++ b/Sprint-1.pptx
@@ -11458,6 +11458,71 @@
           </a:p>
         </p:txBody>
       </p:sp>
+      <p:cxnSp>
+        <p:nvCxnSpPr>
+          <p:cNvPr id="5" name="Straight Connector 4"/>
+          <p:cNvCxnSpPr>
+            <a:stCxn id="10" idx="3"/>
+            <a:endCxn id="18" idx="1"/>
+          </p:cNvCxnSpPr>
+          <p:nvPr/>
+        </p:nvCxnSpPr>
+        <p:spPr>
+          <a:xfrm flipV="1">
+            <a:off x="4927628" y="4383444"/>
+            <a:ext cx="508000" cy="3"/>
+          </a:xfrm>
+          <a:prstGeom prst="line">
+            <a:avLst/>
+          </a:prstGeom>
+        </p:spPr>
+        <p:style>
+          <a:lnRef idx="1">
+            <a:schemeClr val="dk1"/>
+          </a:lnRef>
+          <a:fillRef idx="0">
+            <a:schemeClr val="dk1"/>
+          </a:fillRef>
+          <a:effectRef idx="0">
+            <a:schemeClr val="dk1"/>
+          </a:effectRef>
+          <a:fontRef idx="minor">
+            <a:schemeClr val="tx1"/>
+          </a:fontRef>
+        </p:style>
+      </p:cxnSp>
+      <p:cxnSp>
+        <p:nvCxnSpPr>
+          <p:cNvPr id="7" name="Straight Connector 6"/>
+          <p:cNvCxnSpPr>
+            <a:stCxn id="18" idx="3"/>
+          </p:cNvCxnSpPr>
+          <p:nvPr/>
+        </p:nvCxnSpPr>
+        <p:spPr>
+          <a:xfrm>
+            <a:off x="6754290" y="4383444"/>
+            <a:ext cx="565797" cy="0"/>
+          </a:xfrm>
+          <a:prstGeom prst="line">
+            <a:avLst/>
+          </a:prstGeom>
+        </p:spPr>
+        <p:style>
+          <a:lnRef idx="1">
+            <a:schemeClr val="dk1"/>
+          </a:lnRef>
+          <a:fillRef idx="0">
+            <a:schemeClr val="dk1"/>
+          </a:fillRef>
+          <a:effectRef idx="0">
+            <a:schemeClr val="dk1"/>
+          </a:effectRef>
+          <a:fontRef idx="minor">
+            <a:schemeClr val="tx1"/>
+          </a:fontRef>
+        </p:style>
+      </p:cxnSp>
     </p:spTree>
     <p:extLst>
       <p:ext uri="{BB962C8B-B14F-4D97-AF65-F5344CB8AC3E}">

</xml_diff>